<commit_message>
Change name to nombre
</commit_message>
<xml_diff>
--- a/man/figures/logo.pptx
+++ b/man/figures/logo.pptx
@@ -243,7 +243,7 @@
           <a:p>
             <a:fld id="{8AA7341E-E8D5-574D-9C77-42D65F8270B5}" type="datetimeFigureOut">
               <a:rPr lang="en-US" smtClean="0"/>
-              <a:t>May 11</a:t>
+              <a:t>May 12</a:t>
             </a:fld>
             <a:endParaRPr lang="en-US"/>
           </a:p>
@@ -413,7 +413,7 @@
           <a:p>
             <a:fld id="{8AA7341E-E8D5-574D-9C77-42D65F8270B5}" type="datetimeFigureOut">
               <a:rPr lang="en-US" smtClean="0"/>
-              <a:t>May 11</a:t>
+              <a:t>May 12</a:t>
             </a:fld>
             <a:endParaRPr lang="en-US"/>
           </a:p>
@@ -593,7 +593,7 @@
           <a:p>
             <a:fld id="{8AA7341E-E8D5-574D-9C77-42D65F8270B5}" type="datetimeFigureOut">
               <a:rPr lang="en-US" smtClean="0"/>
-              <a:t>May 11</a:t>
+              <a:t>May 12</a:t>
             </a:fld>
             <a:endParaRPr lang="en-US"/>
           </a:p>
@@ -763,7 +763,7 @@
           <a:p>
             <a:fld id="{8AA7341E-E8D5-574D-9C77-42D65F8270B5}" type="datetimeFigureOut">
               <a:rPr lang="en-US" smtClean="0"/>
-              <a:t>May 11</a:t>
+              <a:t>May 12</a:t>
             </a:fld>
             <a:endParaRPr lang="en-US"/>
           </a:p>
@@ -1007,7 +1007,7 @@
           <a:p>
             <a:fld id="{8AA7341E-E8D5-574D-9C77-42D65F8270B5}" type="datetimeFigureOut">
               <a:rPr lang="en-US" smtClean="0"/>
-              <a:t>May 11</a:t>
+              <a:t>May 12</a:t>
             </a:fld>
             <a:endParaRPr lang="en-US"/>
           </a:p>
@@ -1239,7 +1239,7 @@
           <a:p>
             <a:fld id="{8AA7341E-E8D5-574D-9C77-42D65F8270B5}" type="datetimeFigureOut">
               <a:rPr lang="en-US" smtClean="0"/>
-              <a:t>May 11</a:t>
+              <a:t>May 12</a:t>
             </a:fld>
             <a:endParaRPr lang="en-US"/>
           </a:p>
@@ -1606,7 +1606,7 @@
           <a:p>
             <a:fld id="{8AA7341E-E8D5-574D-9C77-42D65F8270B5}" type="datetimeFigureOut">
               <a:rPr lang="en-US" smtClean="0"/>
-              <a:t>May 11</a:t>
+              <a:t>May 12</a:t>
             </a:fld>
             <a:endParaRPr lang="en-US"/>
           </a:p>
@@ -1724,7 +1724,7 @@
           <a:p>
             <a:fld id="{8AA7341E-E8D5-574D-9C77-42D65F8270B5}" type="datetimeFigureOut">
               <a:rPr lang="en-US" smtClean="0"/>
-              <a:t>May 11</a:t>
+              <a:t>May 12</a:t>
             </a:fld>
             <a:endParaRPr lang="en-US"/>
           </a:p>
@@ -1819,7 +1819,7 @@
           <a:p>
             <a:fld id="{8AA7341E-E8D5-574D-9C77-42D65F8270B5}" type="datetimeFigureOut">
               <a:rPr lang="en-US" smtClean="0"/>
-              <a:t>May 11</a:t>
+              <a:t>May 12</a:t>
             </a:fld>
             <a:endParaRPr lang="en-US"/>
           </a:p>
@@ -2096,7 +2096,7 @@
           <a:p>
             <a:fld id="{8AA7341E-E8D5-574D-9C77-42D65F8270B5}" type="datetimeFigureOut">
               <a:rPr lang="en-US" smtClean="0"/>
-              <a:t>May 11</a:t>
+              <a:t>May 12</a:t>
             </a:fld>
             <a:endParaRPr lang="en-US"/>
           </a:p>
@@ -2353,7 +2353,7 @@
           <a:p>
             <a:fld id="{8AA7341E-E8D5-574D-9C77-42D65F8270B5}" type="datetimeFigureOut">
               <a:rPr lang="en-US" smtClean="0"/>
-              <a:t>May 11</a:t>
+              <a:t>May 12</a:t>
             </a:fld>
             <a:endParaRPr lang="en-US"/>
           </a:p>
@@ -2566,7 +2566,7 @@
           <a:p>
             <a:fld id="{8AA7341E-E8D5-574D-9C77-42D65F8270B5}" type="datetimeFigureOut">
               <a:rPr lang="en-US" smtClean="0"/>
-              <a:t>May 11</a:t>
+              <a:t>May 12</a:t>
             </a:fld>
             <a:endParaRPr lang="en-US"/>
           </a:p>
@@ -2997,11 +2997,11 @@
             </a:avLst>
           </a:prstGeom>
           <a:solidFill>
-            <a:srgbClr val="6EBDE0"/>
+            <a:srgbClr val="537AE9"/>
           </a:solidFill>
           <a:ln w="825500">
             <a:solidFill>
-              <a:srgbClr val="6D4D42"/>
+              <a:srgbClr val="2D6DAD"/>
             </a:solidFill>
           </a:ln>
         </p:spPr>
@@ -3089,12 +3089,103 @@
           </a:p>
         </p:txBody>
       </p:sp>
+      <p:sp>
+        <p:nvSpPr>
+          <p:cNvPr id="2" name="TextBox 1">
+            <a:extLst>
+              <a:ext uri="{FF2B5EF4-FFF2-40B4-BE49-F238E27FC236}">
+                <a16:creationId xmlns:a16="http://schemas.microsoft.com/office/drawing/2014/main" id="{B11222F3-C4D3-4452-BFCB-FD446D5023C8}"/>
+              </a:ext>
+            </a:extLst>
+          </p:cNvPr>
+          <p:cNvSpPr txBox="1"/>
+          <p:nvPr/>
+        </p:nvSpPr>
+        <p:spPr>
+          <a:xfrm>
+            <a:off x="5611086" y="-4919226"/>
+            <a:ext cx="11454938" cy="32408872"/>
+          </a:xfrm>
+          <a:prstGeom prst="rect">
+            <a:avLst/>
+          </a:prstGeom>
+          <a:noFill/>
+        </p:spPr>
+        <p:txBody>
+          <a:bodyPr wrap="square" rtlCol="0">
+            <a:spAutoFit/>
+          </a:bodyPr>
+          <a:lstStyle/>
+          <a:p>
+            <a:pPr algn="ctr"/>
+            <a:r>
+              <a:rPr lang="en-US" sz="210000" dirty="0">
+                <a:solidFill>
+                  <a:srgbClr val="FFFFFF"/>
+                </a:solidFill>
+                <a:latin typeface="Source Sans Pro Black" panose="020B0803030403020204" pitchFamily="34" charset="0"/>
+                <a:ea typeface="Source Sans Pro Black" panose="020B0803030403020204" pitchFamily="34" charset="0"/>
+              </a:rPr>
+              <a:t>2</a:t>
+            </a:r>
+          </a:p>
+        </p:txBody>
+      </p:sp>
+      <p:sp>
+        <p:nvSpPr>
+          <p:cNvPr id="4" name="TextBox 3">
+            <a:extLst>
+              <a:ext uri="{FF2B5EF4-FFF2-40B4-BE49-F238E27FC236}">
+                <a16:creationId xmlns:a16="http://schemas.microsoft.com/office/drawing/2014/main" id="{D30D4F30-3B69-467B-8AB3-6BC0CAE59A25}"/>
+              </a:ext>
+            </a:extLst>
+          </p:cNvPr>
+          <p:cNvSpPr txBox="1"/>
+          <p:nvPr/>
+        </p:nvSpPr>
+        <p:spPr>
+          <a:xfrm>
+            <a:off x="1147157" y="15899127"/>
+            <a:ext cx="19867418" cy="5016758"/>
+          </a:xfrm>
+          <a:prstGeom prst="rect">
+            <a:avLst/>
+          </a:prstGeom>
+          <a:noFill/>
+        </p:spPr>
+        <p:txBody>
+          <a:bodyPr wrap="square" rtlCol="0">
+            <a:spAutoFit/>
+          </a:bodyPr>
+          <a:lstStyle/>
+          <a:p>
+            <a:pPr algn="ctr"/>
+            <a:r>
+              <a:rPr lang="en-US" sz="31000" spc="-2000" dirty="0" err="1">
+                <a:solidFill>
+                  <a:srgbClr val="2D6DAD"/>
+                </a:solidFill>
+                <a:effectLst/>
+                <a:latin typeface="Source Sans Pro" panose="020B0503030403020204" pitchFamily="34" charset="0"/>
+              </a:rPr>
+              <a:t>nombre</a:t>
+            </a:r>
+            <a:endParaRPr lang="en-US" sz="31000" spc="-2000" dirty="0">
+              <a:solidFill>
+                <a:srgbClr val="2D6DAD"/>
+              </a:solidFill>
+              <a:effectLst/>
+              <a:latin typeface="Source Sans Pro" panose="020B0503030403020204" pitchFamily="34" charset="0"/>
+            </a:endParaRPr>
+          </a:p>
+        </p:txBody>
+      </p:sp>
       <p:grpSp>
         <p:nvGrpSpPr>
-          <p:cNvPr id="8" name="Group 7">
+          <p:cNvPr id="30" name="Group 29">
             <a:extLst>
               <a:ext uri="{FF2B5EF4-FFF2-40B4-BE49-F238E27FC236}">
-                <a16:creationId xmlns:a16="http://schemas.microsoft.com/office/drawing/2014/main" id="{FEF29D42-616D-4B30-8419-890840609420}"/>
+                <a16:creationId xmlns:a16="http://schemas.microsoft.com/office/drawing/2014/main" id="{4951F498-E549-4901-93B2-EDDF9A7794C2}"/>
               </a:ext>
             </a:extLst>
           </p:cNvPr>
@@ -3103,7 +3194,7 @@
         </p:nvGrpSpPr>
         <p:grpSpPr>
           <a:xfrm>
-            <a:off x="5598221" y="5157099"/>
+            <a:off x="25099879" y="7016099"/>
             <a:ext cx="8487262" cy="8252328"/>
             <a:chOff x="5598221" y="5526065"/>
             <a:chExt cx="8487262" cy="8252328"/>
@@ -3111,10 +3202,10 @@
         </p:grpSpPr>
         <p:grpSp>
           <p:nvGrpSpPr>
-            <p:cNvPr id="24" name="Graphic 21">
+            <p:cNvPr id="31" name="Graphic 21">
               <a:extLst>
                 <a:ext uri="{FF2B5EF4-FFF2-40B4-BE49-F238E27FC236}">
-                  <a16:creationId xmlns:a16="http://schemas.microsoft.com/office/drawing/2014/main" id="{85E3588F-899F-4B1B-B16C-16D5D56EDD33}"/>
+                  <a16:creationId xmlns:a16="http://schemas.microsoft.com/office/drawing/2014/main" id="{90ABBC70-80F1-4C14-AF72-9D39154B6AC8}"/>
                 </a:ext>
               </a:extLst>
             </p:cNvPr>
@@ -3134,10 +3225,10 @@
           </p:grpSpPr>
           <p:sp>
             <p:nvSpPr>
-              <p:cNvPr id="25" name="Freeform: Shape 24">
+              <p:cNvPr id="43" name="Freeform: Shape 42">
                 <a:extLst>
                   <a:ext uri="{FF2B5EF4-FFF2-40B4-BE49-F238E27FC236}">
-                    <a16:creationId xmlns:a16="http://schemas.microsoft.com/office/drawing/2014/main" id="{BA4D4A1A-7680-4954-A826-5BB53B56ACE0}"/>
+                    <a16:creationId xmlns:a16="http://schemas.microsoft.com/office/drawing/2014/main" id="{1AC94FC7-8186-4CC1-8DE8-75A09F4C7855}"/>
                   </a:ext>
                 </a:extLst>
               </p:cNvPr>
@@ -3246,10 +3337,10 @@
           </p:sp>
           <p:sp>
             <p:nvSpPr>
-              <p:cNvPr id="26" name="Freeform: Shape 25">
+              <p:cNvPr id="44" name="Freeform: Shape 43">
                 <a:extLst>
                   <a:ext uri="{FF2B5EF4-FFF2-40B4-BE49-F238E27FC236}">
-                    <a16:creationId xmlns:a16="http://schemas.microsoft.com/office/drawing/2014/main" id="{79BC5F93-2F08-4745-8423-E663EE32ECC7}"/>
+                    <a16:creationId xmlns:a16="http://schemas.microsoft.com/office/drawing/2014/main" id="{CA8BE973-306E-40D8-99C6-627348899BE4}"/>
                   </a:ext>
                 </a:extLst>
               </p:cNvPr>
@@ -3359,10 +3450,10 @@
         </p:grpSp>
         <p:sp>
           <p:nvSpPr>
-            <p:cNvPr id="29" name="Freeform: Shape 28">
+            <p:cNvPr id="32" name="Freeform: Shape 31">
               <a:extLst>
                 <a:ext uri="{FF2B5EF4-FFF2-40B4-BE49-F238E27FC236}">
-                  <a16:creationId xmlns:a16="http://schemas.microsoft.com/office/drawing/2014/main" id="{7D608C0F-8111-4EFA-9986-58308EB6160A}"/>
+                  <a16:creationId xmlns:a16="http://schemas.microsoft.com/office/drawing/2014/main" id="{8E976AC1-7B68-49AA-A9EE-604EC8770FEF}"/>
                 </a:ext>
               </a:extLst>
             </p:cNvPr>
@@ -3459,10 +3550,10 @@
         </p:sp>
         <p:sp>
           <p:nvSpPr>
-            <p:cNvPr id="521" name="Freeform: Shape 520">
+            <p:cNvPr id="33" name="Freeform: Shape 32">
               <a:extLst>
                 <a:ext uri="{FF2B5EF4-FFF2-40B4-BE49-F238E27FC236}">
-                  <a16:creationId xmlns:a16="http://schemas.microsoft.com/office/drawing/2014/main" id="{2E9AE8AF-D36A-4C2E-875C-5A8E9E9B1A22}"/>
+                  <a16:creationId xmlns:a16="http://schemas.microsoft.com/office/drawing/2014/main" id="{7B39712C-9686-495B-8241-6A6E44FB0486}"/>
                 </a:ext>
               </a:extLst>
             </p:cNvPr>
@@ -3567,10 +3658,10 @@
         </p:sp>
         <p:grpSp>
           <p:nvGrpSpPr>
-            <p:cNvPr id="522" name="Graphic 21">
+            <p:cNvPr id="34" name="Graphic 21">
               <a:extLst>
                 <a:ext uri="{FF2B5EF4-FFF2-40B4-BE49-F238E27FC236}">
-                  <a16:creationId xmlns:a16="http://schemas.microsoft.com/office/drawing/2014/main" id="{85E3588F-899F-4B1B-B16C-16D5D56EDD33}"/>
+                  <a16:creationId xmlns:a16="http://schemas.microsoft.com/office/drawing/2014/main" id="{67C90E12-0ED6-416A-B8BF-6C8142439709}"/>
                 </a:ext>
               </a:extLst>
             </p:cNvPr>
@@ -3590,10 +3681,10 @@
           </p:grpSpPr>
           <p:sp>
             <p:nvSpPr>
-              <p:cNvPr id="523" name="Freeform: Shape 522">
+              <p:cNvPr id="41" name="Freeform: Shape 40">
                 <a:extLst>
                   <a:ext uri="{FF2B5EF4-FFF2-40B4-BE49-F238E27FC236}">
-                    <a16:creationId xmlns:a16="http://schemas.microsoft.com/office/drawing/2014/main" id="{220BDB0A-9BFA-4BD0-82EB-FC2DEA33D1A7}"/>
+                    <a16:creationId xmlns:a16="http://schemas.microsoft.com/office/drawing/2014/main" id="{87F086D5-65C0-4FCD-8D63-5138A1F761F4}"/>
                   </a:ext>
                 </a:extLst>
               </p:cNvPr>
@@ -3684,10 +3775,10 @@
           </p:sp>
           <p:sp>
             <p:nvSpPr>
-              <p:cNvPr id="524" name="Freeform: Shape 523">
+              <p:cNvPr id="42" name="Freeform: Shape 41">
                 <a:extLst>
                   <a:ext uri="{FF2B5EF4-FFF2-40B4-BE49-F238E27FC236}">
-                    <a16:creationId xmlns:a16="http://schemas.microsoft.com/office/drawing/2014/main" id="{3C306050-1CFD-4B15-BAE2-A0BE4B3E2013}"/>
+                    <a16:creationId xmlns:a16="http://schemas.microsoft.com/office/drawing/2014/main" id="{AF7366A9-114E-44FA-9C66-F179274EA5AC}"/>
                   </a:ext>
                 </a:extLst>
               </p:cNvPr>
@@ -3799,10 +3890,10 @@
         </p:grpSp>
         <p:sp>
           <p:nvSpPr>
-            <p:cNvPr id="525" name="Freeform: Shape 524">
+            <p:cNvPr id="35" name="Freeform: Shape 34">
               <a:extLst>
                 <a:ext uri="{FF2B5EF4-FFF2-40B4-BE49-F238E27FC236}">
-                  <a16:creationId xmlns:a16="http://schemas.microsoft.com/office/drawing/2014/main" id="{5AC13F74-4FD3-4F92-8194-1F6D7A0468BE}"/>
+                  <a16:creationId xmlns:a16="http://schemas.microsoft.com/office/drawing/2014/main" id="{AD1F480C-924F-4F90-A3EA-FC2594392827}"/>
                 </a:ext>
               </a:extLst>
             </p:cNvPr>
@@ -3901,10 +3992,10 @@
         </p:sp>
         <p:sp>
           <p:nvSpPr>
-            <p:cNvPr id="526" name="Freeform: Shape 525">
+            <p:cNvPr id="37" name="Freeform: Shape 36">
               <a:extLst>
                 <a:ext uri="{FF2B5EF4-FFF2-40B4-BE49-F238E27FC236}">
-                  <a16:creationId xmlns:a16="http://schemas.microsoft.com/office/drawing/2014/main" id="{BB4B97CE-6BDA-47F2-B1F7-82293C43D8C8}"/>
+                  <a16:creationId xmlns:a16="http://schemas.microsoft.com/office/drawing/2014/main" id="{F833E6DB-8C55-4547-BF5F-BE97B8309EE8}"/>
                 </a:ext>
               </a:extLst>
             </p:cNvPr>
@@ -3997,10 +4088,10 @@
         </p:sp>
         <p:sp>
           <p:nvSpPr>
-            <p:cNvPr id="538" name="Freeform: Shape 537">
+            <p:cNvPr id="38" name="Freeform: Shape 37">
               <a:extLst>
                 <a:ext uri="{FF2B5EF4-FFF2-40B4-BE49-F238E27FC236}">
-                  <a16:creationId xmlns:a16="http://schemas.microsoft.com/office/drawing/2014/main" id="{F51A75D0-0019-4C18-ACB2-40BAA708F91E}"/>
+                  <a16:creationId xmlns:a16="http://schemas.microsoft.com/office/drawing/2014/main" id="{35DAC677-D2A9-4278-B135-FB242F3E2E75}"/>
                 </a:ext>
               </a:extLst>
             </p:cNvPr>
@@ -4111,10 +4202,10 @@
         </p:sp>
         <p:sp>
           <p:nvSpPr>
-            <p:cNvPr id="539" name="Freeform: Shape 538">
+            <p:cNvPr id="39" name="Freeform: Shape 38">
               <a:extLst>
                 <a:ext uri="{FF2B5EF4-FFF2-40B4-BE49-F238E27FC236}">
-                  <a16:creationId xmlns:a16="http://schemas.microsoft.com/office/drawing/2014/main" id="{66AA2305-EDD8-4617-8480-BD5DBF61B97A}"/>
+                  <a16:creationId xmlns:a16="http://schemas.microsoft.com/office/drawing/2014/main" id="{9D6D5974-FD28-4473-A35B-BE1016868B33}"/>
                 </a:ext>
               </a:extLst>
             </p:cNvPr>
@@ -4227,10 +4318,10 @@
         </p:sp>
         <p:sp>
           <p:nvSpPr>
-            <p:cNvPr id="540" name="Freeform: Shape 539">
+            <p:cNvPr id="40" name="Freeform: Shape 39">
               <a:extLst>
                 <a:ext uri="{FF2B5EF4-FFF2-40B4-BE49-F238E27FC236}">
-                  <a16:creationId xmlns:a16="http://schemas.microsoft.com/office/drawing/2014/main" id="{16A3B521-0EEA-45D6-BAF7-215D2270AB6B}"/>
+                  <a16:creationId xmlns:a16="http://schemas.microsoft.com/office/drawing/2014/main" id="{33B135CA-DF9A-4B2A-BCDF-785B4FF9EE98}"/>
                 </a:ext>
               </a:extLst>
             </p:cNvPr>
@@ -4330,10 +4421,275 @@
       </p:grpSp>
       <p:grpSp>
         <p:nvGrpSpPr>
-          <p:cNvPr id="550" name="Group 549">
+          <p:cNvPr id="9" name="Group 8">
             <a:extLst>
               <a:ext uri="{FF2B5EF4-FFF2-40B4-BE49-F238E27FC236}">
-                <a16:creationId xmlns:a16="http://schemas.microsoft.com/office/drawing/2014/main" id="{2D55852D-1375-48EA-B3FB-E5355A759C15}"/>
+                <a16:creationId xmlns:a16="http://schemas.microsoft.com/office/drawing/2014/main" id="{9749A34C-36F2-497D-8F6B-59349620A468}"/>
+              </a:ext>
+            </a:extLst>
+          </p:cNvPr>
+          <p:cNvGrpSpPr/>
+          <p:nvPr/>
+        </p:nvGrpSpPr>
+        <p:grpSpPr>
+          <a:xfrm rot="337586">
+            <a:off x="9338191" y="9984481"/>
+            <a:ext cx="6858000" cy="4572000"/>
+            <a:chOff x="14994193" y="10174502"/>
+            <a:chExt cx="6858000" cy="4572000"/>
+          </a:xfrm>
+          <a:effectLst>
+            <a:outerShdw blurRad="50800" dist="38100" dir="5400000" algn="t" rotWithShape="0">
+              <a:prstClr val="black">
+                <a:alpha val="40000"/>
+              </a:prstClr>
+            </a:outerShdw>
+          </a:effectLst>
+        </p:grpSpPr>
+        <p:grpSp>
+          <p:nvGrpSpPr>
+            <p:cNvPr id="7" name="Group 6">
+              <a:extLst>
+                <a:ext uri="{FF2B5EF4-FFF2-40B4-BE49-F238E27FC236}">
+                  <a16:creationId xmlns:a16="http://schemas.microsoft.com/office/drawing/2014/main" id="{BF326716-45BE-4EEF-901F-EEAE62DE281F}"/>
+                </a:ext>
+              </a:extLst>
+            </p:cNvPr>
+            <p:cNvGrpSpPr/>
+            <p:nvPr/>
+          </p:nvGrpSpPr>
+          <p:grpSpPr>
+            <a:xfrm>
+              <a:off x="14994193" y="10174502"/>
+              <a:ext cx="6858000" cy="4572000"/>
+              <a:chOff x="10110183" y="10157877"/>
+              <a:chExt cx="6858000" cy="4572000"/>
+            </a:xfrm>
+          </p:grpSpPr>
+          <p:sp>
+            <p:nvSpPr>
+              <p:cNvPr id="3" name="Rectangle: Rounded Corners 2">
+                <a:extLst>
+                  <a:ext uri="{FF2B5EF4-FFF2-40B4-BE49-F238E27FC236}">
+                    <a16:creationId xmlns:a16="http://schemas.microsoft.com/office/drawing/2014/main" id="{E3D63E48-F042-4885-A206-C8FE2B1DA12A}"/>
+                  </a:ext>
+                </a:extLst>
+              </p:cNvPr>
+              <p:cNvSpPr/>
+              <p:nvPr/>
+            </p:nvSpPr>
+            <p:spPr>
+              <a:xfrm>
+                <a:off x="10110183" y="10157877"/>
+                <a:ext cx="6858000" cy="4572000"/>
+              </a:xfrm>
+              <a:prstGeom prst="roundRect">
+                <a:avLst>
+                  <a:gd name="adj" fmla="val 10000"/>
+                </a:avLst>
+              </a:prstGeom>
+              <a:solidFill>
+                <a:srgbClr val="E95552"/>
+              </a:solidFill>
+              <a:ln>
+                <a:noFill/>
+              </a:ln>
+            </p:spPr>
+            <p:style>
+              <a:lnRef idx="2">
+                <a:schemeClr val="accent1">
+                  <a:shade val="50000"/>
+                </a:schemeClr>
+              </a:lnRef>
+              <a:fillRef idx="1">
+                <a:schemeClr val="accent1"/>
+              </a:fillRef>
+              <a:effectRef idx="0">
+                <a:schemeClr val="accent1"/>
+              </a:effectRef>
+              <a:fontRef idx="minor">
+                <a:schemeClr val="lt1"/>
+              </a:fontRef>
+            </p:style>
+            <p:txBody>
+              <a:bodyPr rtlCol="0" anchor="ctr"/>
+              <a:lstStyle/>
+              <a:p>
+                <a:pPr algn="ctr"/>
+                <a:endParaRPr lang="en-US"/>
+              </a:p>
+            </p:txBody>
+          </p:sp>
+          <p:sp>
+            <p:nvSpPr>
+              <p:cNvPr id="45" name="Rectangle: Rounded Corners 44">
+                <a:extLst>
+                  <a:ext uri="{FF2B5EF4-FFF2-40B4-BE49-F238E27FC236}">
+                    <a16:creationId xmlns:a16="http://schemas.microsoft.com/office/drawing/2014/main" id="{CE599B25-6604-4B98-8C22-7FF6669E1DE6}"/>
+                  </a:ext>
+                </a:extLst>
+              </p:cNvPr>
+              <p:cNvSpPr/>
+              <p:nvPr/>
+            </p:nvSpPr>
+            <p:spPr>
+              <a:xfrm>
+                <a:off x="10338783" y="12209788"/>
+                <a:ext cx="6400800" cy="2286000"/>
+              </a:xfrm>
+              <a:prstGeom prst="roundRect">
+                <a:avLst>
+                  <a:gd name="adj" fmla="val 10000"/>
+                </a:avLst>
+              </a:prstGeom>
+              <a:solidFill>
+                <a:srgbClr val="FFFFFF"/>
+              </a:solidFill>
+              <a:ln>
+                <a:noFill/>
+              </a:ln>
+            </p:spPr>
+            <p:style>
+              <a:lnRef idx="2">
+                <a:schemeClr val="accent1">
+                  <a:shade val="50000"/>
+                </a:schemeClr>
+              </a:lnRef>
+              <a:fillRef idx="1">
+                <a:schemeClr val="accent1"/>
+              </a:fillRef>
+              <a:effectRef idx="0">
+                <a:schemeClr val="accent1"/>
+              </a:effectRef>
+              <a:fontRef idx="minor">
+                <a:schemeClr val="lt1"/>
+              </a:fontRef>
+            </p:style>
+            <p:txBody>
+              <a:bodyPr rtlCol="0" anchor="ctr"/>
+              <a:lstStyle/>
+              <a:p>
+                <a:pPr algn="ctr"/>
+                <a:endParaRPr lang="en-US"/>
+              </a:p>
+            </p:txBody>
+          </p:sp>
+        </p:grpSp>
+        <p:sp>
+          <p:nvSpPr>
+            <p:cNvPr id="47" name="TextBox 46">
+              <a:extLst>
+                <a:ext uri="{FF2B5EF4-FFF2-40B4-BE49-F238E27FC236}">
+                  <a16:creationId xmlns:a16="http://schemas.microsoft.com/office/drawing/2014/main" id="{3CF82A2A-1B42-45D8-9B99-707D1EB0FCA0}"/>
+                </a:ext>
+              </a:extLst>
+            </p:cNvPr>
+            <p:cNvSpPr txBox="1"/>
+            <p:nvPr/>
+          </p:nvSpPr>
+          <p:spPr>
+            <a:xfrm>
+              <a:off x="15637332" y="12277761"/>
+              <a:ext cx="5571722" cy="2400657"/>
+            </a:xfrm>
+            <a:prstGeom prst="rect">
+              <a:avLst/>
+            </a:prstGeom>
+            <a:noFill/>
+          </p:spPr>
+          <p:txBody>
+            <a:bodyPr wrap="square" rtlCol="0">
+              <a:spAutoFit/>
+            </a:bodyPr>
+            <a:lstStyle/>
+            <a:p>
+              <a:pPr algn="ctr"/>
+              <a:r>
+                <a:rPr lang="en-US" sz="15000" dirty="0">
+                  <a:solidFill>
+                    <a:srgbClr val="2D6DAD"/>
+                  </a:solidFill>
+                  <a:effectLst/>
+                  <a:latin typeface="Permanent Marker" panose="02000000000000000000" pitchFamily="2" charset="0"/>
+                  <a:ea typeface="Permanent Marker" panose="02000000000000000000" pitchFamily="2" charset="0"/>
+                </a:rPr>
+                <a:t>TWO</a:t>
+              </a:r>
+            </a:p>
+          </p:txBody>
+        </p:sp>
+        <p:sp>
+          <p:nvSpPr>
+            <p:cNvPr id="46" name="TextBox 45">
+              <a:extLst>
+                <a:ext uri="{FF2B5EF4-FFF2-40B4-BE49-F238E27FC236}">
+                  <a16:creationId xmlns:a16="http://schemas.microsoft.com/office/drawing/2014/main" id="{44CE1B90-419A-4F1E-AD79-42D51D3D3756}"/>
+                </a:ext>
+              </a:extLst>
+            </p:cNvPr>
+            <p:cNvSpPr txBox="1"/>
+            <p:nvPr/>
+          </p:nvSpPr>
+          <p:spPr>
+            <a:xfrm>
+              <a:off x="16107099" y="10472171"/>
+              <a:ext cx="4632187" cy="1747081"/>
+            </a:xfrm>
+            <a:prstGeom prst="rect">
+              <a:avLst/>
+            </a:prstGeom>
+            <a:noFill/>
+          </p:spPr>
+          <p:txBody>
+            <a:bodyPr wrap="square" rtlCol="0">
+              <a:spAutoFit/>
+            </a:bodyPr>
+            <a:lstStyle/>
+            <a:p>
+              <a:pPr algn="ctr">
+                <a:lnSpc>
+                  <a:spcPct val="70000"/>
+                </a:lnSpc>
+              </a:pPr>
+              <a:r>
+                <a:rPr lang="en-US" sz="9000" b="1" dirty="0">
+                  <a:solidFill>
+                    <a:srgbClr val="FFFFFF"/>
+                  </a:solidFill>
+                  <a:effectLst/>
+                  <a:latin typeface="Source Sans Pro" panose="020B0503030403020204" pitchFamily="34" charset="0"/>
+                  <a:ea typeface="Source Sans Pro" panose="020B0503030403020204" pitchFamily="34" charset="0"/>
+                </a:rPr>
+                <a:t>HELLO</a:t>
+              </a:r>
+            </a:p>
+            <a:p>
+              <a:pPr algn="ctr">
+                <a:lnSpc>
+                  <a:spcPct val="70000"/>
+                </a:lnSpc>
+              </a:pPr>
+              <a:r>
+                <a:rPr lang="en-US" sz="6000" b="1" dirty="0">
+                  <a:solidFill>
+                    <a:srgbClr val="FFFFFF"/>
+                  </a:solidFill>
+                  <a:effectLst/>
+                  <a:latin typeface="Source Sans Pro" panose="020B0503030403020204" pitchFamily="34" charset="0"/>
+                  <a:ea typeface="Source Sans Pro" panose="020B0503030403020204" pitchFamily="34" charset="0"/>
+                </a:rPr>
+                <a:t>MY NAME IS</a:t>
+              </a:r>
+            </a:p>
+          </p:txBody>
+        </p:sp>
+      </p:grpSp>
+      <p:grpSp>
+        <p:nvGrpSpPr>
+          <p:cNvPr id="1068" name="Group 1067">
+            <a:extLst>
+              <a:ext uri="{FF2B5EF4-FFF2-40B4-BE49-F238E27FC236}">
+                <a16:creationId xmlns:a16="http://schemas.microsoft.com/office/drawing/2014/main" id="{FF291595-211C-4C9A-8664-DC5A5BB9BC04}"/>
               </a:ext>
             </a:extLst>
           </p:cNvPr>
@@ -4342,18 +4698,18 @@
         </p:nvGrpSpPr>
         <p:grpSpPr>
           <a:xfrm>
-            <a:off x="769925" y="12066633"/>
-            <a:ext cx="18128357" cy="4200004"/>
-            <a:chOff x="769925" y="12784730"/>
-            <a:chExt cx="18128357" cy="4200004"/>
+            <a:off x="8800871" y="3287228"/>
+            <a:ext cx="4343857" cy="2886644"/>
+            <a:chOff x="16730434" y="-7094316"/>
+            <a:chExt cx="2309935" cy="1535032"/>
           </a:xfrm>
         </p:grpSpPr>
         <p:sp>
           <p:nvSpPr>
-            <p:cNvPr id="27" name="Freeform: Shape 26">
+            <p:cNvPr id="1064" name="Freeform: Shape 1063">
               <a:extLst>
                 <a:ext uri="{FF2B5EF4-FFF2-40B4-BE49-F238E27FC236}">
-                  <a16:creationId xmlns:a16="http://schemas.microsoft.com/office/drawing/2014/main" id="{3D26048D-ED02-4338-A8D9-3DBBFFFC7BC4}"/>
+                  <a16:creationId xmlns:a16="http://schemas.microsoft.com/office/drawing/2014/main" id="{AE18EB6E-7ECC-4873-917D-36751B08EA0E}"/>
                 </a:ext>
               </a:extLst>
             </p:cNvPr>
@@ -4361,31 +4717,23 @@
             <p:nvPr/>
           </p:nvSpPr>
           <p:spPr>
-            <a:xfrm rot="417303">
-              <a:off x="785414" y="12784730"/>
-              <a:ext cx="18112868" cy="4200004"/>
+            <a:xfrm>
+              <a:off x="18238894" y="-6164869"/>
+              <a:ext cx="600712" cy="605585"/>
             </a:xfrm>
             <a:custGeom>
               <a:avLst/>
               <a:gdLst>
-                <a:gd name="connsiteX0" fmla="*/ 0 w 7247068"/>
-                <a:gd name="connsiteY0" fmla="*/ 2476807 h 2476807"/>
-                <a:gd name="connsiteX1" fmla="*/ 2134710 w 7247068"/>
-                <a:gd name="connsiteY1" fmla="*/ 1259112 h 2476807"/>
-                <a:gd name="connsiteX2" fmla="*/ 5487101 w 7247068"/>
-                <a:gd name="connsiteY2" fmla="*/ 612674 h 2476807"/>
-                <a:gd name="connsiteX3" fmla="*/ 7245992 w 7247068"/>
-                <a:gd name="connsiteY3" fmla="*/ 336697 h 2476807"/>
-                <a:gd name="connsiteX4" fmla="*/ 5607373 w 7247068"/>
-                <a:gd name="connsiteY4" fmla="*/ 11342 h 2476807"/>
-                <a:gd name="connsiteX5" fmla="*/ 3126905 w 7247068"/>
-                <a:gd name="connsiteY5" fmla="*/ 522463 h 2476807"/>
-                <a:gd name="connsiteX6" fmla="*/ 0 w 7247068"/>
-                <a:gd name="connsiteY6" fmla="*/ 1063659 h 2476807"/>
-                <a:gd name="connsiteX7" fmla="*/ 0 w 7247068"/>
-                <a:gd name="connsiteY7" fmla="*/ 2476807 h 2476807"/>
-                <a:gd name="connsiteX8" fmla="*/ 0 w 7247068"/>
-                <a:gd name="connsiteY8" fmla="*/ 2476807 h 2476807"/>
+                <a:gd name="connsiteX0" fmla="*/ 306601 w 600712"/>
+                <a:gd name="connsiteY0" fmla="*/ 606891 h 605585"/>
+                <a:gd name="connsiteX1" fmla="*/ 1357 w 600712"/>
+                <a:gd name="connsiteY1" fmla="*/ 298055 h 605585"/>
+                <a:gd name="connsiteX2" fmla="*/ 303438 w 600712"/>
+                <a:gd name="connsiteY2" fmla="*/ 1765 h 605585"/>
+                <a:gd name="connsiteX3" fmla="*/ 602033 w 600712"/>
+                <a:gd name="connsiteY3" fmla="*/ 318108 h 605585"/>
+                <a:gd name="connsiteX4" fmla="*/ 306601 w 600712"/>
+                <a:gd name="connsiteY4" fmla="*/ 606891 h 605585"/>
               </a:gdLst>
               <a:ahLst/>
               <a:cxnLst>
@@ -4404,69 +4752,41 @@
                 <a:cxn ang="0">
                   <a:pos x="connsiteX4" y="connsiteY4"/>
                 </a:cxn>
-                <a:cxn ang="0">
-                  <a:pos x="connsiteX5" y="connsiteY5"/>
-                </a:cxn>
-                <a:cxn ang="0">
-                  <a:pos x="connsiteX6" y="connsiteY6"/>
-                </a:cxn>
-                <a:cxn ang="0">
-                  <a:pos x="connsiteX7" y="connsiteY7"/>
-                </a:cxn>
-                <a:cxn ang="0">
-                  <a:pos x="connsiteX8" y="connsiteY8"/>
-                </a:cxn>
               </a:cxnLst>
               <a:rect l="l" t="t" r="r" b="b"/>
               <a:pathLst>
-                <a:path w="7247068" h="2476807">
+                <a:path w="600712" h="605585">
                   <a:moveTo>
-                    <a:pt x="0" y="2476807"/>
+                    <a:pt x="306601" y="606891"/>
                   </a:moveTo>
                   <a:cubicBezTo>
-                    <a:pt x="0" y="2476807"/>
-                    <a:pt x="1007212" y="1259112"/>
-                    <a:pt x="2134710" y="1259112"/>
+                    <a:pt x="161513" y="614076"/>
+                    <a:pt x="-251" y="475797"/>
+                    <a:pt x="1357" y="298055"/>
                   </a:cubicBezTo>
                   <a:cubicBezTo>
-                    <a:pt x="3262208" y="1259112"/>
-                    <a:pt x="3788359" y="1589839"/>
-                    <a:pt x="5487101" y="612674"/>
+                    <a:pt x="2912" y="131841"/>
+                    <a:pt x="138296" y="-1184"/>
+                    <a:pt x="303438" y="1765"/>
                   </a:cubicBezTo>
                   <a:cubicBezTo>
-                    <a:pt x="6028297" y="327038"/>
-                    <a:pt x="7215916" y="767279"/>
-                    <a:pt x="7245992" y="336697"/>
+                    <a:pt x="468580" y="4714"/>
+                    <a:pt x="604178" y="147926"/>
+                    <a:pt x="602033" y="318108"/>
                   </a:cubicBezTo>
                   <a:cubicBezTo>
-                    <a:pt x="7276067" y="-93886"/>
-                    <a:pt x="6674735" y="11342"/>
-                    <a:pt x="5607373" y="11342"/>
+                    <a:pt x="599727" y="499978"/>
+                    <a:pt x="444344" y="615095"/>
+                    <a:pt x="306601" y="606891"/>
                   </a:cubicBezTo>
-                  <a:cubicBezTo>
-                    <a:pt x="4540010" y="11342"/>
-                    <a:pt x="4284450" y="747962"/>
-                    <a:pt x="3126905" y="522463"/>
-                  </a:cubicBezTo>
-                  <a:cubicBezTo>
-                    <a:pt x="2315104" y="296978"/>
-                    <a:pt x="826832" y="627705"/>
-                    <a:pt x="0" y="1063659"/>
-                  </a:cubicBezTo>
-                  <a:lnTo>
-                    <a:pt x="0" y="2476807"/>
-                  </a:lnTo>
-                  <a:lnTo>
-                    <a:pt x="0" y="2476807"/>
-                  </a:lnTo>
                   <a:close/>
                 </a:path>
               </a:pathLst>
             </a:custGeom>
             <a:solidFill>
-              <a:srgbClr val="6D4D42"/>
+              <a:srgbClr val="060505"/>
             </a:solidFill>
-            <a:ln w="14288" cap="flat">
+            <a:ln w="5362" cap="flat">
               <a:noFill/>
               <a:prstDash val="solid"/>
               <a:miter/>
@@ -4482,10 +4802,10 @@
         </p:sp>
         <p:sp>
           <p:nvSpPr>
-            <p:cNvPr id="28" name="Freeform: Shape 27">
+            <p:cNvPr id="1065" name="Freeform: Shape 1064">
               <a:extLst>
                 <a:ext uri="{FF2B5EF4-FFF2-40B4-BE49-F238E27FC236}">
-                  <a16:creationId xmlns:a16="http://schemas.microsoft.com/office/drawing/2014/main" id="{FF98FE03-BA92-46BE-A713-497BA8B37C0F}"/>
+                  <a16:creationId xmlns:a16="http://schemas.microsoft.com/office/drawing/2014/main" id="{71CD5071-6E6B-4EF3-B64C-A7C2B759170E}"/>
                 </a:ext>
               </a:extLst>
             </p:cNvPr>
@@ -4493,31 +4813,23 @@
             <p:nvPr/>
           </p:nvSpPr>
           <p:spPr>
-            <a:xfrm rot="417303">
-              <a:off x="769925" y="13039414"/>
-              <a:ext cx="18112891" cy="3944379"/>
+            <a:xfrm>
+              <a:off x="17013763" y="-6122447"/>
+              <a:ext cx="477344" cy="475234"/>
             </a:xfrm>
             <a:custGeom>
               <a:avLst/>
               <a:gdLst>
-                <a:gd name="connsiteX0" fmla="*/ 5487101 w 7247077"/>
-                <a:gd name="connsiteY0" fmla="*/ 167578 h 2326061"/>
-                <a:gd name="connsiteX1" fmla="*/ 2134696 w 7247077"/>
-                <a:gd name="connsiteY1" fmla="*/ 814016 h 2326061"/>
-                <a:gd name="connsiteX2" fmla="*/ 0 w 7247077"/>
-                <a:gd name="connsiteY2" fmla="*/ 2031682 h 2326061"/>
-                <a:gd name="connsiteX3" fmla="*/ 0 w 7247077"/>
-                <a:gd name="connsiteY3" fmla="*/ 2326062 h 2326061"/>
-                <a:gd name="connsiteX4" fmla="*/ 2134710 w 7247077"/>
-                <a:gd name="connsiteY4" fmla="*/ 1108381 h 2326061"/>
-                <a:gd name="connsiteX5" fmla="*/ 5487114 w 7247077"/>
-                <a:gd name="connsiteY5" fmla="*/ 461943 h 2326061"/>
-                <a:gd name="connsiteX6" fmla="*/ 7246006 w 7247077"/>
-                <a:gd name="connsiteY6" fmla="*/ 185966 h 2326061"/>
-                <a:gd name="connsiteX7" fmla="*/ 7200343 w 7247077"/>
-                <a:gd name="connsiteY7" fmla="*/ 0 h 2326061"/>
-                <a:gd name="connsiteX8" fmla="*/ 5487101 w 7247077"/>
-                <a:gd name="connsiteY8" fmla="*/ 167578 h 2326061"/>
+                <a:gd name="connsiteX0" fmla="*/ 245612 w 477344"/>
+                <a:gd name="connsiteY0" fmla="*/ 476912 h 475234"/>
+                <a:gd name="connsiteX1" fmla="*/ 1439 w 477344"/>
+                <a:gd name="connsiteY1" fmla="*/ 245338 h 475234"/>
+                <a:gd name="connsiteX2" fmla="*/ 234728 w 477344"/>
+                <a:gd name="connsiteY2" fmla="*/ 1754 h 475234"/>
+                <a:gd name="connsiteX3" fmla="*/ 478687 w 477344"/>
+                <a:gd name="connsiteY3" fmla="*/ 234883 h 475234"/>
+                <a:gd name="connsiteX4" fmla="*/ 245612 w 477344"/>
+                <a:gd name="connsiteY4" fmla="*/ 476912 h 475234"/>
               </a:gdLst>
               <a:ahLst/>
               <a:cxnLst>
@@ -4536,71 +4848,383 @@
                 <a:cxn ang="0">
                   <a:pos x="connsiteX4" y="connsiteY4"/>
                 </a:cxn>
-                <a:cxn ang="0">
-                  <a:pos x="connsiteX5" y="connsiteY5"/>
-                </a:cxn>
-                <a:cxn ang="0">
-                  <a:pos x="connsiteX6" y="connsiteY6"/>
-                </a:cxn>
-                <a:cxn ang="0">
-                  <a:pos x="connsiteX7" y="connsiteY7"/>
-                </a:cxn>
-                <a:cxn ang="0">
-                  <a:pos x="connsiteX8" y="connsiteY8"/>
-                </a:cxn>
               </a:cxnLst>
               <a:rect l="l" t="t" r="r" b="b"/>
               <a:pathLst>
-                <a:path w="7247077" h="2326061">
+                <a:path w="477344" h="475234">
                   <a:moveTo>
-                    <a:pt x="5487101" y="167578"/>
+                    <a:pt x="245612" y="476912"/>
                   </a:moveTo>
                   <a:cubicBezTo>
-                    <a:pt x="3788359" y="1144743"/>
-                    <a:pt x="3262194" y="814016"/>
-                    <a:pt x="2134696" y="814016"/>
+                    <a:pt x="112427" y="479217"/>
+                    <a:pt x="5192" y="377505"/>
+                    <a:pt x="1439" y="245338"/>
                   </a:cubicBezTo>
                   <a:cubicBezTo>
-                    <a:pt x="1007197" y="814016"/>
-                    <a:pt x="0" y="2031682"/>
-                    <a:pt x="0" y="2031682"/>
-                  </a:cubicBezTo>
-                  <a:lnTo>
-                    <a:pt x="0" y="2326062"/>
-                  </a:lnTo>
-                  <a:cubicBezTo>
-                    <a:pt x="0" y="2326062"/>
-                    <a:pt x="1007226" y="1108381"/>
-                    <a:pt x="2134710" y="1108381"/>
+                    <a:pt x="-2261" y="115852"/>
+                    <a:pt x="104706" y="4060"/>
+                    <a:pt x="234728" y="1754"/>
                   </a:cubicBezTo>
                   <a:cubicBezTo>
-                    <a:pt x="3262194" y="1108381"/>
-                    <a:pt x="3788359" y="1439108"/>
-                    <a:pt x="5487114" y="461943"/>
+                    <a:pt x="364750" y="-551"/>
+                    <a:pt x="478044" y="104539"/>
+                    <a:pt x="478687" y="234883"/>
                   </a:cubicBezTo>
                   <a:cubicBezTo>
-                    <a:pt x="6028311" y="176308"/>
-                    <a:pt x="7215931" y="616548"/>
-                    <a:pt x="7246006" y="185966"/>
-                  </a:cubicBezTo>
-                  <a:cubicBezTo>
-                    <a:pt x="7251492" y="107427"/>
-                    <a:pt x="7235862" y="46777"/>
-                    <a:pt x="7200343" y="0"/>
-                  </a:cubicBezTo>
-                  <a:cubicBezTo>
-                    <a:pt x="6973958" y="237773"/>
-                    <a:pt x="5971589" y="-88111"/>
-                    <a:pt x="5487101" y="167578"/>
+                    <a:pt x="479384" y="389569"/>
+                    <a:pt x="356171" y="479110"/>
+                    <a:pt x="245612" y="476912"/>
                   </a:cubicBezTo>
                   <a:close/>
                 </a:path>
               </a:pathLst>
             </a:custGeom>
             <a:solidFill>
-              <a:srgbClr val="5F433A"/>
+              <a:srgbClr val="0E0C0C"/>
             </a:solidFill>
-            <a:ln w="14288" cap="flat">
+            <a:ln w="5362" cap="flat">
+              <a:noFill/>
+              <a:prstDash val="solid"/>
+              <a:miter/>
+            </a:ln>
+          </p:spPr>
+          <p:txBody>
+            <a:bodyPr rtlCol="0" anchor="ctr"/>
+            <a:lstStyle/>
+            <a:p>
+              <a:endParaRPr lang="en-US"/>
+            </a:p>
+          </p:txBody>
+        </p:sp>
+        <p:sp>
+          <p:nvSpPr>
+            <p:cNvPr id="1066" name="Freeform: Shape 1065">
+              <a:extLst>
+                <a:ext uri="{FF2B5EF4-FFF2-40B4-BE49-F238E27FC236}">
+                  <a16:creationId xmlns:a16="http://schemas.microsoft.com/office/drawing/2014/main" id="{4C4FB785-5BDD-4F63-9E82-6940DBF49364}"/>
+                </a:ext>
+              </a:extLst>
+            </p:cNvPr>
+            <p:cNvSpPr/>
+            <p:nvPr/>
+          </p:nvSpPr>
+          <p:spPr>
+            <a:xfrm>
+              <a:off x="18375952" y="-7094316"/>
+              <a:ext cx="664417" cy="405749"/>
+            </a:xfrm>
+            <a:custGeom>
+              <a:avLst/>
+              <a:gdLst>
+                <a:gd name="connsiteX0" fmla="*/ 1346 w 664417"/>
+                <a:gd name="connsiteY0" fmla="*/ 150222 h 405749"/>
+                <a:gd name="connsiteX1" fmla="*/ 14804 w 664417"/>
+                <a:gd name="connsiteY1" fmla="*/ 106631 h 405749"/>
+                <a:gd name="connsiteX2" fmla="*/ 621806 w 664417"/>
+                <a:gd name="connsiteY2" fmla="*/ 212740 h 405749"/>
+                <a:gd name="connsiteX3" fmla="*/ 664056 w 664417"/>
+                <a:gd name="connsiteY3" fmla="*/ 333164 h 405749"/>
+                <a:gd name="connsiteX4" fmla="*/ 616284 w 664417"/>
+                <a:gd name="connsiteY4" fmla="*/ 406030 h 405749"/>
+                <a:gd name="connsiteX5" fmla="*/ 547439 w 664417"/>
+                <a:gd name="connsiteY5" fmla="*/ 367909 h 405749"/>
+                <a:gd name="connsiteX6" fmla="*/ 522024 w 664417"/>
+                <a:gd name="connsiteY6" fmla="*/ 298206 h 405749"/>
+                <a:gd name="connsiteX7" fmla="*/ 465350 w 664417"/>
+                <a:gd name="connsiteY7" fmla="*/ 196333 h 405749"/>
+                <a:gd name="connsiteX8" fmla="*/ 299780 w 664417"/>
+                <a:gd name="connsiteY8" fmla="*/ 111510 h 405749"/>
+                <a:gd name="connsiteX9" fmla="*/ 110672 w 664417"/>
+                <a:gd name="connsiteY9" fmla="*/ 138319 h 405749"/>
+                <a:gd name="connsiteX10" fmla="*/ 28476 w 664417"/>
+                <a:gd name="connsiteY10" fmla="*/ 158961 h 405749"/>
+                <a:gd name="connsiteX11" fmla="*/ 1346 w 664417"/>
+                <a:gd name="connsiteY11" fmla="*/ 150222 h 405749"/>
+              </a:gdLst>
+              <a:ahLst/>
+              <a:cxnLst>
+                <a:cxn ang="0">
+                  <a:pos x="connsiteX0" y="connsiteY0"/>
+                </a:cxn>
+                <a:cxn ang="0">
+                  <a:pos x="connsiteX1" y="connsiteY1"/>
+                </a:cxn>
+                <a:cxn ang="0">
+                  <a:pos x="connsiteX2" y="connsiteY2"/>
+                </a:cxn>
+                <a:cxn ang="0">
+                  <a:pos x="connsiteX3" y="connsiteY3"/>
+                </a:cxn>
+                <a:cxn ang="0">
+                  <a:pos x="connsiteX4" y="connsiteY4"/>
+                </a:cxn>
+                <a:cxn ang="0">
+                  <a:pos x="connsiteX5" y="connsiteY5"/>
+                </a:cxn>
+                <a:cxn ang="0">
+                  <a:pos x="connsiteX6" y="connsiteY6"/>
+                </a:cxn>
+                <a:cxn ang="0">
+                  <a:pos x="connsiteX7" y="connsiteY7"/>
+                </a:cxn>
+                <a:cxn ang="0">
+                  <a:pos x="connsiteX8" y="connsiteY8"/>
+                </a:cxn>
+                <a:cxn ang="0">
+                  <a:pos x="connsiteX9" y="connsiteY9"/>
+                </a:cxn>
+                <a:cxn ang="0">
+                  <a:pos x="connsiteX10" y="connsiteY10"/>
+                </a:cxn>
+                <a:cxn ang="0">
+                  <a:pos x="connsiteX11" y="connsiteY11"/>
+                </a:cxn>
+              </a:cxnLst>
+              <a:rect l="l" t="t" r="r" b="b"/>
+              <a:pathLst>
+                <a:path w="664417" h="405749">
+                  <a:moveTo>
+                    <a:pt x="1346" y="150222"/>
+                  </a:moveTo>
+                  <a:cubicBezTo>
+                    <a:pt x="5581" y="135584"/>
+                    <a:pt x="5099" y="115692"/>
+                    <a:pt x="14804" y="106631"/>
+                  </a:cubicBezTo>
+                  <a:cubicBezTo>
+                    <a:pt x="203430" y="-69717"/>
+                    <a:pt x="507387" y="-16689"/>
+                    <a:pt x="621806" y="212740"/>
+                  </a:cubicBezTo>
+                  <a:cubicBezTo>
+                    <a:pt x="640063" y="251296"/>
+                    <a:pt x="654223" y="291654"/>
+                    <a:pt x="664056" y="333164"/>
+                  </a:cubicBezTo>
+                  <a:cubicBezTo>
+                    <a:pt x="672474" y="366032"/>
+                    <a:pt x="648668" y="397505"/>
+                    <a:pt x="616284" y="406030"/>
+                  </a:cubicBezTo>
+                  <a:cubicBezTo>
+                    <a:pt x="591566" y="412518"/>
+                    <a:pt x="560307" y="396540"/>
+                    <a:pt x="547439" y="367909"/>
+                  </a:cubicBezTo>
+                  <a:cubicBezTo>
+                    <a:pt x="537359" y="345282"/>
+                    <a:pt x="532801" y="320135"/>
+                    <a:pt x="522024" y="298206"/>
+                  </a:cubicBezTo>
+                  <a:cubicBezTo>
+                    <a:pt x="505081" y="263194"/>
+                    <a:pt x="488942" y="226680"/>
+                    <a:pt x="465350" y="196333"/>
+                  </a:cubicBezTo>
+                  <a:cubicBezTo>
+                    <a:pt x="424226" y="143627"/>
+                    <a:pt x="368303" y="114781"/>
+                    <a:pt x="299780" y="111510"/>
+                  </a:cubicBezTo>
+                  <a:cubicBezTo>
+                    <a:pt x="235632" y="108754"/>
+                    <a:pt x="171527" y="117842"/>
+                    <a:pt x="110672" y="138319"/>
+                  </a:cubicBezTo>
+                  <a:cubicBezTo>
+                    <a:pt x="83648" y="146624"/>
+                    <a:pt x="56218" y="153519"/>
+                    <a:pt x="28476" y="158961"/>
+                  </a:cubicBezTo>
+                  <a:cubicBezTo>
+                    <a:pt x="22578" y="159766"/>
+                    <a:pt x="15340" y="154726"/>
+                    <a:pt x="1346" y="150222"/>
+                  </a:cubicBezTo>
+                  <a:close/>
+                </a:path>
+              </a:pathLst>
+            </a:custGeom>
+            <a:solidFill>
+              <a:srgbClr val="151313"/>
+            </a:solidFill>
+            <a:ln w="5362" cap="flat">
+              <a:noFill/>
+              <a:prstDash val="solid"/>
+              <a:miter/>
+            </a:ln>
+          </p:spPr>
+          <p:txBody>
+            <a:bodyPr rtlCol="0" anchor="ctr"/>
+            <a:lstStyle/>
+            <a:p>
+              <a:endParaRPr lang="en-US"/>
+            </a:p>
+          </p:txBody>
+        </p:sp>
+        <p:sp>
+          <p:nvSpPr>
+            <p:cNvPr id="1067" name="Freeform: Shape 1066">
+              <a:extLst>
+                <a:ext uri="{FF2B5EF4-FFF2-40B4-BE49-F238E27FC236}">
+                  <a16:creationId xmlns:a16="http://schemas.microsoft.com/office/drawing/2014/main" id="{DB26F365-B32E-476A-B544-B9A36AB0E54B}"/>
+                </a:ext>
+              </a:extLst>
+            </p:cNvPr>
+            <p:cNvSpPr/>
+            <p:nvPr/>
+          </p:nvSpPr>
+          <p:spPr>
+            <a:xfrm>
+              <a:off x="16730434" y="-6881037"/>
+              <a:ext cx="504044" cy="526224"/>
+            </a:xfrm>
+            <a:custGeom>
+              <a:avLst/>
+              <a:gdLst>
+                <a:gd name="connsiteX0" fmla="*/ 1346 w 504044"/>
+                <a:gd name="connsiteY0" fmla="*/ 451884 h 526224"/>
+                <a:gd name="connsiteX1" fmla="*/ 147346 w 504044"/>
+                <a:gd name="connsiteY1" fmla="*/ 89002 h 526224"/>
+                <a:gd name="connsiteX2" fmla="*/ 389321 w 504044"/>
+                <a:gd name="connsiteY2" fmla="*/ 7825 h 526224"/>
+                <a:gd name="connsiteX3" fmla="*/ 483312 w 504044"/>
+                <a:gd name="connsiteY3" fmla="*/ 53722 h 526224"/>
+                <a:gd name="connsiteX4" fmla="*/ 500148 w 504044"/>
+                <a:gd name="connsiteY4" fmla="*/ 120582 h 526224"/>
+                <a:gd name="connsiteX5" fmla="*/ 430177 w 504044"/>
+                <a:gd name="connsiteY5" fmla="*/ 156292 h 526224"/>
+                <a:gd name="connsiteX6" fmla="*/ 400849 w 504044"/>
+                <a:gd name="connsiteY6" fmla="*/ 144121 h 526224"/>
+                <a:gd name="connsiteX7" fmla="*/ 210668 w 504044"/>
+                <a:gd name="connsiteY7" fmla="*/ 199025 h 526224"/>
+                <a:gd name="connsiteX8" fmla="*/ 101235 w 504044"/>
+                <a:gd name="connsiteY8" fmla="*/ 405023 h 526224"/>
+                <a:gd name="connsiteX9" fmla="*/ 60593 w 504044"/>
+                <a:gd name="connsiteY9" fmla="*/ 514778 h 526224"/>
+                <a:gd name="connsiteX10" fmla="*/ 35017 w 504044"/>
+                <a:gd name="connsiteY10" fmla="*/ 527860 h 526224"/>
+                <a:gd name="connsiteX11" fmla="*/ 13999 w 504044"/>
+                <a:gd name="connsiteY11" fmla="*/ 508880 h 526224"/>
+                <a:gd name="connsiteX12" fmla="*/ 1346 w 504044"/>
+                <a:gd name="connsiteY12" fmla="*/ 451884 h 526224"/>
+              </a:gdLst>
+              <a:ahLst/>
+              <a:cxnLst>
+                <a:cxn ang="0">
+                  <a:pos x="connsiteX0" y="connsiteY0"/>
+                </a:cxn>
+                <a:cxn ang="0">
+                  <a:pos x="connsiteX1" y="connsiteY1"/>
+                </a:cxn>
+                <a:cxn ang="0">
+                  <a:pos x="connsiteX2" y="connsiteY2"/>
+                </a:cxn>
+                <a:cxn ang="0">
+                  <a:pos x="connsiteX3" y="connsiteY3"/>
+                </a:cxn>
+                <a:cxn ang="0">
+                  <a:pos x="connsiteX4" y="connsiteY4"/>
+                </a:cxn>
+                <a:cxn ang="0">
+                  <a:pos x="connsiteX5" y="connsiteY5"/>
+                </a:cxn>
+                <a:cxn ang="0">
+                  <a:pos x="connsiteX6" y="connsiteY6"/>
+                </a:cxn>
+                <a:cxn ang="0">
+                  <a:pos x="connsiteX7" y="connsiteY7"/>
+                </a:cxn>
+                <a:cxn ang="0">
+                  <a:pos x="connsiteX8" y="connsiteY8"/>
+                </a:cxn>
+                <a:cxn ang="0">
+                  <a:pos x="connsiteX9" y="connsiteY9"/>
+                </a:cxn>
+                <a:cxn ang="0">
+                  <a:pos x="connsiteX10" y="connsiteY10"/>
+                </a:cxn>
+                <a:cxn ang="0">
+                  <a:pos x="connsiteX11" y="connsiteY11"/>
+                </a:cxn>
+                <a:cxn ang="0">
+                  <a:pos x="connsiteX12" y="connsiteY12"/>
+                </a:cxn>
+              </a:cxnLst>
+              <a:rect l="l" t="t" r="r" b="b"/>
+              <a:pathLst>
+                <a:path w="504044" h="526224">
+                  <a:moveTo>
+                    <a:pt x="1346" y="451884"/>
+                  </a:moveTo>
+                  <a:cubicBezTo>
+                    <a:pt x="9710" y="310656"/>
+                    <a:pt x="48690" y="187336"/>
+                    <a:pt x="147346" y="89002"/>
+                  </a:cubicBezTo>
+                  <a:cubicBezTo>
+                    <a:pt x="214099" y="22409"/>
+                    <a:pt x="293989" y="-13407"/>
+                    <a:pt x="389321" y="7825"/>
+                  </a:cubicBezTo>
+                  <a:cubicBezTo>
+                    <a:pt x="422510" y="15224"/>
+                    <a:pt x="454413" y="34634"/>
+                    <a:pt x="483312" y="53722"/>
+                  </a:cubicBezTo>
+                  <a:cubicBezTo>
+                    <a:pt x="506582" y="69163"/>
+                    <a:pt x="510121" y="98760"/>
+                    <a:pt x="500148" y="120582"/>
+                  </a:cubicBezTo>
+                  <a:cubicBezTo>
+                    <a:pt x="486905" y="148785"/>
+                    <a:pt x="460042" y="163101"/>
+                    <a:pt x="430177" y="156292"/>
+                  </a:cubicBezTo>
+                  <a:cubicBezTo>
+                    <a:pt x="419990" y="153933"/>
+                    <a:pt x="410714" y="147981"/>
+                    <a:pt x="400849" y="144121"/>
+                  </a:cubicBezTo>
+                  <a:cubicBezTo>
+                    <a:pt x="323372" y="113612"/>
+                    <a:pt x="261926" y="139670"/>
+                    <a:pt x="210668" y="199025"/>
+                  </a:cubicBezTo>
+                  <a:cubicBezTo>
+                    <a:pt x="158659" y="259291"/>
+                    <a:pt x="125899" y="329958"/>
+                    <a:pt x="101235" y="405023"/>
+                  </a:cubicBezTo>
+                  <a:cubicBezTo>
+                    <a:pt x="89064" y="442072"/>
+                    <a:pt x="75767" y="478854"/>
+                    <a:pt x="60593" y="514778"/>
+                  </a:cubicBezTo>
+                  <a:cubicBezTo>
+                    <a:pt x="57590" y="521909"/>
+                    <a:pt x="43274" y="528772"/>
+                    <a:pt x="35017" y="527860"/>
+                  </a:cubicBezTo>
+                  <a:cubicBezTo>
+                    <a:pt x="26760" y="526949"/>
+                    <a:pt x="16680" y="517137"/>
+                    <a:pt x="13999" y="508880"/>
+                  </a:cubicBezTo>
+                  <a:cubicBezTo>
+                    <a:pt x="8654" y="490151"/>
+                    <a:pt x="4428" y="471117"/>
+                    <a:pt x="1346" y="451884"/>
+                  </a:cubicBezTo>
+                  <a:close/>
+                </a:path>
+              </a:pathLst>
+            </a:custGeom>
+            <a:solidFill>
+              <a:srgbClr val="151313"/>
+            </a:solidFill>
+            <a:ln w="5362" cap="flat">
               <a:noFill/>
               <a:prstDash val="solid"/>
               <a:miter/>
@@ -4615,105 +5239,6 @@
           </p:txBody>
         </p:sp>
       </p:grpSp>
-      <p:sp>
-        <p:nvSpPr>
-          <p:cNvPr id="4" name="TextBox 3">
-            <a:extLst>
-              <a:ext uri="{FF2B5EF4-FFF2-40B4-BE49-F238E27FC236}">
-                <a16:creationId xmlns:a16="http://schemas.microsoft.com/office/drawing/2014/main" id="{D30D4F30-3B69-467B-8AB3-6BC0CAE59A25}"/>
-              </a:ext>
-            </a:extLst>
-          </p:cNvPr>
-          <p:cNvSpPr txBox="1"/>
-          <p:nvPr/>
-        </p:nvSpPr>
-        <p:spPr>
-          <a:xfrm>
-            <a:off x="1030778" y="13488449"/>
-            <a:ext cx="19867418" cy="5632311"/>
-          </a:xfrm>
-          <a:prstGeom prst="rect">
-            <a:avLst/>
-          </a:prstGeom>
-          <a:noFill/>
-        </p:spPr>
-        <p:txBody>
-          <a:bodyPr wrap="square" rtlCol="0">
-            <a:spAutoFit/>
-          </a:bodyPr>
-          <a:lstStyle/>
-          <a:p>
-            <a:pPr algn="ctr"/>
-            <a:r>
-              <a:rPr lang="en-US" sz="36000" spc="-1000" dirty="0">
-                <a:solidFill>
-                  <a:srgbClr val="42606E"/>
-                </a:solidFill>
-                <a:effectLst/>
-                <a:latin typeface="Source Sans Pro" panose="020B0503030403020204" pitchFamily="34" charset="0"/>
-              </a:rPr>
-              <a:t>numerate</a:t>
-            </a:r>
-          </a:p>
-        </p:txBody>
-      </p:sp>
-      <p:sp>
-        <p:nvSpPr>
-          <p:cNvPr id="22" name="Hexagon 21">
-            <a:extLst>
-              <a:ext uri="{FF2B5EF4-FFF2-40B4-BE49-F238E27FC236}">
-                <a16:creationId xmlns:a16="http://schemas.microsoft.com/office/drawing/2014/main" id="{B2E941A3-B4CB-400F-BD98-95E56261B8F5}"/>
-              </a:ext>
-            </a:extLst>
-          </p:cNvPr>
-          <p:cNvSpPr>
-            <a:spLocks noChangeAspect="1"/>
-          </p:cNvSpPr>
-          <p:nvPr/>
-        </p:nvSpPr>
-        <p:spPr>
-          <a:xfrm rot="5400000">
-            <a:off x="-914402" y="2363037"/>
-            <a:ext cx="23774404" cy="20694565"/>
-          </a:xfrm>
-          <a:prstGeom prst="hexagon">
-            <a:avLst>
-              <a:gd name="adj" fmla="val 28372"/>
-              <a:gd name="vf" fmla="val 115470"/>
-            </a:avLst>
-          </a:prstGeom>
-          <a:noFill/>
-          <a:ln w="825500">
-            <a:solidFill>
-              <a:srgbClr val="6D4D42"/>
-            </a:solidFill>
-          </a:ln>
-        </p:spPr>
-        <p:style>
-          <a:lnRef idx="2">
-            <a:schemeClr val="accent1">
-              <a:shade val="50000"/>
-            </a:schemeClr>
-          </a:lnRef>
-          <a:fillRef idx="1">
-            <a:schemeClr val="accent1"/>
-          </a:fillRef>
-          <a:effectRef idx="0">
-            <a:schemeClr val="accent1"/>
-          </a:effectRef>
-          <a:fontRef idx="minor">
-            <a:schemeClr val="lt1"/>
-          </a:fontRef>
-        </p:style>
-        <p:txBody>
-          <a:bodyPr rtlCol="0" anchor="ctr"/>
-          <a:lstStyle/>
-          <a:p>
-            <a:pPr algn="ctr"/>
-            <a:endParaRPr lang="en-US" dirty="0"/>
-          </a:p>
-        </p:txBody>
-      </p:sp>
     </p:spTree>
     <p:extLst>
       <p:ext uri="{BB962C8B-B14F-4D97-AF65-F5344CB8AC3E}">

</xml_diff>